<commit_message>
Project 5 Completed as of 02052020
</commit_message>
<xml_diff>
--- a/Project 5 ML (Final).pptx
+++ b/Project 5 ML (Final).pptx
@@ -4453,6 +4453,33 @@
           <a:p>
             <a:endParaRPr lang="en-US" b="0" dirty="0"/>
           </a:p>
+          <a:p>
+            <a:r>
+              <a:rPr lang="en-US" sz="1200" b="1" i="0" kern="1200">
+                <a:solidFill>
+                  <a:schemeClr val="tx1"/>
+                </a:solidFill>
+                <a:effectLst/>
+                <a:latin typeface="Arial" charset="0"/>
+                <a:ea typeface="+mn-ea"/>
+                <a:cs typeface="+mn-cs"/>
+              </a:rPr>
+              <a:t>Question:</a:t>
+            </a:r>
+            <a:r>
+              <a:rPr lang="en-US" sz="1200" b="0" i="0" kern="1200">
+                <a:solidFill>
+                  <a:schemeClr val="tx1"/>
+                </a:solidFill>
+                <a:effectLst/>
+                <a:latin typeface="Arial" charset="0"/>
+                <a:ea typeface="+mn-ea"/>
+                <a:cs typeface="+mn-cs"/>
+              </a:rPr>
+              <a:t> Can we predict the income level of an individual given their demographic and social economic attributes?</a:t>
+            </a:r>
+            <a:endParaRPr lang="en-US" b="0" dirty="0"/>
+          </a:p>
         </p:txBody>
       </p:sp>
     </p:spTree>
@@ -9120,7 +9147,15 @@
             </a:pPr>
             <a:r>
               <a:rPr lang="en-US" sz="2400" dirty="0"/>
-              <a:t>Perform cluster analysis on income segment  &gt; 50K to gain more insights on customer profile</a:t>
+              <a:t>Perform cluster analysis on income </a:t>
+            </a:r>
+            <a:r>
+              <a:rPr lang="en-US" sz="2400"/>
+              <a:t>segment  &lt; </a:t>
+            </a:r>
+            <a:r>
+              <a:rPr lang="en-US" sz="2400" dirty="0"/>
+              <a:t>50K to gain more insights on customer profile</a:t>
             </a:r>
           </a:p>
           <a:p>

</xml_diff>